<commit_message>
Gradle-ize examples in slide decks for Spring Cloud Services
</commit_message>
<xml_diff>
--- a/presentations/103 - Intro to Spring Cloud Services/Session_6_SC_Config.pptx
+++ b/presentations/103 - Intro to Spring Cloud Services/Session_6_SC_Config.pptx
@@ -242,7 +242,7 @@
           <a:p>
             <a:fld id="{372E5B6B-8713-8747-AE5B-F1241B2BF5F0}" type="datetimeFigureOut">
               <a:rPr lang="en-US" smtClean="0"/>
-              <a:t>9/7/17</a:t>
+              <a:t>10/3/17</a:t>
             </a:fld>
             <a:endParaRPr lang="en-US"/>
           </a:p>
@@ -408,7 +408,7 @@
           <a:p>
             <a:fld id="{7E7B7340-DDD5-1B49-81AA-25BC4050C073}" type="datetimeFigureOut">
               <a:rPr lang="en-US" smtClean="0"/>
-              <a:t>9/7/17</a:t>
+              <a:t>10/3/17</a:t>
             </a:fld>
             <a:endParaRPr lang="en-US"/>
           </a:p>
@@ -10116,14 +10116,7 @@
                 <a:latin typeface="Courier New"/>
                 <a:cs typeface="Courier New"/>
               </a:rPr>
-              <a:t>reeting</a:t>
-            </a:r>
-            <a:r>
-              <a:rPr lang="en-US" sz="1200" dirty="0" smtClean="0">
-                <a:latin typeface="Courier New"/>
-                <a:cs typeface="Courier New"/>
-              </a:rPr>
-              <a:t>: Bonjour</a:t>
+              <a:t>reeting: Bonjour</a:t>
             </a:r>
           </a:p>
           <a:p>
@@ -10148,8 +10141,8 @@
         </p:nvSpPr>
         <p:spPr>
           <a:xfrm>
-            <a:off x="5151121" y="2616815"/>
-            <a:ext cx="4358640" cy="523220"/>
+            <a:off x="5222240" y="2772787"/>
+            <a:ext cx="3921760" cy="461665"/>
           </a:xfrm>
           <a:prstGeom prst="rect">
             <a:avLst/>
@@ -10163,36 +10156,96 @@
           <a:lstStyle/>
           <a:p>
             <a:r>
-              <a:rPr lang="en-US" sz="1400" b="1" dirty="0">
+              <a:rPr lang="en-US" sz="1200" b="1" dirty="0">
                 <a:solidFill>
                   <a:srgbClr val="008774"/>
                 </a:solidFill>
                 <a:latin typeface="Courier New"/>
                 <a:cs typeface="Courier New"/>
               </a:rPr>
-              <a:t>http://github.com/adamz/config-</a:t>
-            </a:r>
-            <a:r>
-              <a:rPr lang="en-US" sz="1400" b="1" dirty="0" smtClean="0">
+              <a:t>http://</a:t>
+            </a:r>
+            <a:r>
+              <a:rPr lang="en-US" sz="1200" b="1" dirty="0" err="1" smtClean="0">
                 <a:solidFill>
                   <a:srgbClr val="008774"/>
                 </a:solidFill>
                 <a:latin typeface="Courier New"/>
                 <a:cs typeface="Courier New"/>
               </a:rPr>
-              <a:t>repo/blob/master/</a:t>
-            </a:r>
-            <a:r>
-              <a:rPr lang="en-US" sz="1400" b="1" dirty="0" err="1" smtClean="0">
+              <a:t>github.com</a:t>
+            </a:r>
+            <a:r>
+              <a:rPr lang="en-US" sz="1200" b="1" dirty="0" smtClean="0">
                 <a:solidFill>
                   <a:srgbClr val="008774"/>
                 </a:solidFill>
                 <a:latin typeface="Courier New"/>
                 <a:cs typeface="Courier New"/>
               </a:rPr>
-              <a:t>demo.yml</a:t>
-            </a:r>
-            <a:endParaRPr lang="en-US" sz="1400" b="1" dirty="0">
+              <a:t>/</a:t>
+            </a:r>
+            <a:r>
+              <a:rPr lang="en-US" sz="1200" b="1" dirty="0" err="1" smtClean="0">
+                <a:solidFill>
+                  <a:srgbClr val="008774"/>
+                </a:solidFill>
+                <a:latin typeface="Courier New"/>
+                <a:cs typeface="Courier New"/>
+              </a:rPr>
+              <a:t>pacphi</a:t>
+            </a:r>
+            <a:r>
+              <a:rPr lang="en-US" sz="1200" b="1" dirty="0" smtClean="0">
+                <a:solidFill>
+                  <a:srgbClr val="008774"/>
+                </a:solidFill>
+                <a:latin typeface="Courier New"/>
+                <a:cs typeface="Courier New"/>
+              </a:rPr>
+              <a:t>/</a:t>
+            </a:r>
+            <a:r>
+              <a:rPr lang="en-US" sz="1200" b="1" dirty="0" err="1" smtClean="0">
+                <a:solidFill>
+                  <a:srgbClr val="008774"/>
+                </a:solidFill>
+                <a:latin typeface="Courier New"/>
+                <a:cs typeface="Courier New"/>
+              </a:rPr>
+              <a:t>config</a:t>
+            </a:r>
+            <a:r>
+              <a:rPr lang="en-US" sz="1200" b="1" dirty="0">
+                <a:solidFill>
+                  <a:srgbClr val="008774"/>
+                </a:solidFill>
+                <a:latin typeface="Courier New"/>
+                <a:cs typeface="Courier New"/>
+              </a:rPr>
+              <a:t>-</a:t>
+            </a:r>
+            <a:r>
+              <a:rPr lang="en-US" sz="1200" b="1" dirty="0" smtClean="0">
+                <a:solidFill>
+                  <a:srgbClr val="008774"/>
+                </a:solidFill>
+                <a:latin typeface="Courier New"/>
+                <a:cs typeface="Courier New"/>
+              </a:rPr>
+              <a:t>repo/blob/master/cloud-native-</a:t>
+            </a:r>
+            <a:r>
+              <a:rPr lang="en-US" sz="1200" b="1" dirty="0" err="1" smtClean="0">
+                <a:solidFill>
+                  <a:srgbClr val="008774"/>
+                </a:solidFill>
+                <a:latin typeface="Courier New"/>
+                <a:cs typeface="Courier New"/>
+              </a:rPr>
+              <a:t>spring.yml</a:t>
+            </a:r>
+            <a:endParaRPr lang="en-US" sz="1200" b="1" dirty="0">
               <a:solidFill>
                 <a:srgbClr val="008774"/>
               </a:solidFill>
@@ -11672,7 +11725,7 @@
         </p:spPr>
         <p:txBody>
           <a:bodyPr>
-            <a:normAutofit fontScale="92500" lnSpcReduction="20000"/>
+            <a:normAutofit/>
           </a:bodyPr>
           <a:lstStyle/>
           <a:p>
@@ -11680,11 +11733,11 @@
               <a:buNone/>
             </a:pPr>
             <a:r>
-              <a:rPr lang="en-US" sz="1800" b="1" dirty="0"/>
+              <a:rPr lang="en-US" sz="1400" b="1" dirty="0"/>
               <a:t>When running many applications, refreshing each one can be cumbersome</a:t>
             </a:r>
             <a:r>
-              <a:rPr lang="en-US" sz="1800" b="1" dirty="0" smtClean="0"/>
+              <a:rPr lang="en-US" sz="1400" b="1" dirty="0" smtClean="0"/>
               <a:t>.</a:t>
             </a:r>
           </a:p>
@@ -11692,38 +11745,38 @@
             <a:pPr marL="0" indent="0" fontAlgn="base">
               <a:buNone/>
             </a:pPr>
-            <a:endParaRPr lang="en-US" sz="1800" dirty="0"/>
+            <a:endParaRPr lang="en-US" sz="1400" dirty="0"/>
           </a:p>
           <a:p>
             <a:pPr marL="0" indent="0" fontAlgn="base">
               <a:buNone/>
             </a:pPr>
             <a:r>
-              <a:rPr lang="en-US" sz="1800" b="1" dirty="0"/>
+              <a:rPr lang="en-US" sz="1400" b="1" dirty="0"/>
               <a:t>Instead, leverage Spring Cloud Bus pub/sub notification with RabbitMQ.</a:t>
             </a:r>
-            <a:endParaRPr lang="en-US" sz="1800" dirty="0"/>
+            <a:endParaRPr lang="en-US" sz="1400" dirty="0"/>
           </a:p>
           <a:p>
             <a:pPr marL="0" indent="0" fontAlgn="base">
               <a:buNone/>
             </a:pPr>
-            <a:endParaRPr lang="en-US" sz="1800" b="1" dirty="0" smtClean="0"/>
+            <a:endParaRPr lang="en-US" sz="1400" b="1" dirty="0" smtClean="0"/>
           </a:p>
           <a:p>
             <a:pPr marL="0" indent="0" fontAlgn="base">
               <a:buNone/>
             </a:pPr>
             <a:r>
-              <a:rPr lang="en-US" sz="1800" b="1" dirty="0" smtClean="0"/>
+              <a:rPr lang="en-US" sz="1400" b="1" dirty="0" smtClean="0"/>
               <a:t>Send </a:t>
             </a:r>
             <a:r>
-              <a:rPr lang="en-US" sz="1800" b="1" dirty="0"/>
+              <a:rPr lang="en-US" sz="1400" b="1" dirty="0"/>
               <a:t>a POST request to the refresh endpoint to fetch updated config values</a:t>
             </a:r>
             <a:r>
-              <a:rPr lang="en-US" sz="1800" b="1" dirty="0" smtClean="0"/>
+              <a:rPr lang="en-US" sz="1400" b="1" dirty="0" smtClean="0"/>
               <a:t>:</a:t>
             </a:r>
           </a:p>
@@ -11732,42 +11785,42 @@
               <a:buNone/>
             </a:pPr>
             <a:r>
-              <a:rPr lang="en-US" sz="1800" b="1" dirty="0" smtClean="0">
+              <a:rPr lang="en-US" sz="1400" b="1" dirty="0" smtClean="0">
                 <a:hlinkClick r:id="rId3"/>
               </a:rPr>
               <a:t>http</a:t>
             </a:r>
             <a:r>
-              <a:rPr lang="en-US" sz="1800" b="1" dirty="0">
+              <a:rPr lang="en-US" sz="1400" b="1" dirty="0">
                 <a:hlinkClick r:id="rId3"/>
               </a:rPr>
               <a:t>:/</a:t>
             </a:r>
             <a:r>
-              <a:rPr lang="en-US" sz="1800" b="1" dirty="0" smtClean="0">
+              <a:rPr lang="en-US" sz="1400" b="1" dirty="0" smtClean="0">
                 <a:hlinkClick r:id="rId3"/>
               </a:rPr>
               <a:t>/</a:t>
             </a:r>
             <a:r>
-              <a:rPr lang="en-US" sz="1800" dirty="0">
+              <a:rPr lang="en-US" sz="1400" dirty="0">
                 <a:hlinkClick r:id="rId3"/>
               </a:rPr>
               <a:t>my-awesome-app.com</a:t>
             </a:r>
             <a:r>
-              <a:rPr lang="en-US" sz="1800" b="1" dirty="0" smtClean="0">
+              <a:rPr lang="en-US" sz="1400" b="1" dirty="0" smtClean="0">
                 <a:hlinkClick r:id="rId3"/>
               </a:rPr>
               <a:t>/</a:t>
             </a:r>
             <a:r>
-              <a:rPr lang="en-US" sz="1800" b="1" dirty="0">
+              <a:rPr lang="en-US" sz="1400" b="1" dirty="0">
                 <a:hlinkClick r:id="rId3"/>
               </a:rPr>
               <a:t>bus/refresh</a:t>
             </a:r>
-            <a:endParaRPr lang="en-US" sz="1800" dirty="0"/>
+            <a:endParaRPr lang="en-US" sz="1400" dirty="0"/>
           </a:p>
           <a:p>
             <a:pPr marL="0" indent="0" fontAlgn="base">
@@ -11778,61 +11831,6 @@
               <a:t> </a:t>
             </a:r>
             <a:endParaRPr lang="en-US" sz="1800" dirty="0" smtClean="0"/>
-          </a:p>
-          <a:p>
-            <a:pPr marL="0" indent="0" fontAlgn="base">
-              <a:buNone/>
-            </a:pPr>
-            <a:r>
-              <a:rPr lang="en-US" sz="1400" dirty="0" smtClean="0">
-                <a:latin typeface="Courier New"/>
-                <a:cs typeface="Courier New"/>
-              </a:rPr>
-              <a:t>&lt;</a:t>
-            </a:r>
-            <a:r>
-              <a:rPr lang="en-US" sz="1400" dirty="0">
-                <a:latin typeface="Courier New"/>
-                <a:cs typeface="Courier New"/>
-              </a:rPr>
-              <a:t>dependency&gt;     </a:t>
-            </a:r>
-          </a:p>
-          <a:p>
-            <a:pPr marL="0" indent="0" fontAlgn="base">
-              <a:buNone/>
-            </a:pPr>
-            <a:r>
-              <a:rPr lang="en-US" sz="1400" dirty="0">
-                <a:latin typeface="Courier New"/>
-                <a:cs typeface="Courier New"/>
-              </a:rPr>
-              <a:t>     &lt;groupId&gt;org.springframework.cloud&lt;/groupId&gt;</a:t>
-            </a:r>
-          </a:p>
-          <a:p>
-            <a:pPr marL="0" indent="0" fontAlgn="base">
-              <a:buNone/>
-            </a:pPr>
-            <a:r>
-              <a:rPr lang="en-US" sz="1400" dirty="0">
-                <a:latin typeface="Courier New"/>
-                <a:cs typeface="Courier New"/>
-              </a:rPr>
-              <a:t>     &lt;artifactId&gt;spring-cloud-starter-bus-amqp&lt;/artifactId&gt;</a:t>
-            </a:r>
-          </a:p>
-          <a:p>
-            <a:pPr marL="0" indent="0" fontAlgn="base">
-              <a:buNone/>
-            </a:pPr>
-            <a:r>
-              <a:rPr lang="en-US" sz="1400" dirty="0">
-                <a:latin typeface="Courier New"/>
-                <a:cs typeface="Courier New"/>
-              </a:rPr>
-              <a:t> &lt;/dependency&gt;</a:t>
-            </a:r>
           </a:p>
           <a:p>
             <a:pPr marL="0" indent="0">
@@ -11860,6 +11858,36 @@
           <a:xfrm>
             <a:off x="6715760" y="1257300"/>
             <a:ext cx="1996440" cy="1996440"/>
+          </a:xfrm>
+          <a:prstGeom prst="rect">
+            <a:avLst/>
+          </a:prstGeom>
+        </p:spPr>
+      </p:pic>
+      <p:pic>
+        <p:nvPicPr>
+          <p:cNvPr id="3" name="Picture 2"/>
+          <p:cNvPicPr>
+            <a:picLocks noChangeAspect="1"/>
+          </p:cNvPicPr>
+          <p:nvPr/>
+        </p:nvPicPr>
+        <p:blipFill>
+          <a:blip r:embed="rId5">
+            <a:extLst>
+              <a:ext uri="{28A0092B-C50C-407E-A947-70E740481C1C}">
+                <a14:useLocalDpi xmlns:a14="http://schemas.microsoft.com/office/drawing/2010/main" val="0"/>
+              </a:ext>
+            </a:extLst>
+          </a:blip>
+          <a:stretch>
+            <a:fillRect/>
+          </a:stretch>
+        </p:blipFill>
+        <p:spPr>
+          <a:xfrm>
+            <a:off x="457200" y="3565864"/>
+            <a:ext cx="5295900" cy="668316"/>
           </a:xfrm>
           <a:prstGeom prst="rect">
             <a:avLst/>

</xml_diff>